<commit_message>
fix :  - image 파일 수정
</commit_message>
<xml_diff>
--- a/images.pptx
+++ b/images.pptx
@@ -130,6 +130,33 @@
           <inkml:channelProperty channel="F" name="resolution" value="0" units="1/dev"/>
         </inkml:channelProperties>
       </inkml:inkSource>
+      <inkml:timestamp xml:id="ts0" timeString="2019-05-11T03:30:36.746"/>
+    </inkml:context>
+    <inkml:brush xml:id="br0">
+      <inkml:brushProperty name="width" value="0.05" units="cm"/>
+      <inkml:brushProperty name="height" value="0.05" units="cm"/>
+    </inkml:brush>
+  </inkml:definitions>
+  <inkml:trace contextRef="#ctx0" brushRef="#br0">1 1 24575,'0'0'0</inkml:trace>
+</inkml:ink>
+</file>
+
+<file path=ppt/ink/ink2.xml><?xml version="1.0" encoding="utf-8"?>
+<inkml:ink xmlns:inkml="http://www.w3.org/2003/InkML">
+  <inkml:definitions>
+    <inkml:context xml:id="ctx0">
+      <inkml:inkSource xml:id="inkSrc0">
+        <inkml:traceFormat>
+          <inkml:channel name="X" type="integer" min="-2.14748E9" max="2.14748E9" units="cm"/>
+          <inkml:channel name="Y" type="integer" min="-2.14748E9" max="2.14748E9" units="cm"/>
+          <inkml:channel name="F" type="integer" max="32767" units="dev"/>
+        </inkml:traceFormat>
+        <inkml:channelProperties>
+          <inkml:channelProperty channel="X" name="resolution" value="1000" units="1/cm"/>
+          <inkml:channelProperty channel="Y" name="resolution" value="1000" units="1/cm"/>
+          <inkml:channelProperty channel="F" name="resolution" value="0" units="1/dev"/>
+        </inkml:channelProperties>
+      </inkml:inkSource>
       <inkml:timestamp xml:id="ts0" timeString="2019-05-10T10:31:45.841"/>
     </inkml:context>
     <inkml:brush xml:id="br0">
@@ -137,7 +164,8 @@
       <inkml:brushProperty name="height" value="0.05" units="cm"/>
     </inkml:brush>
   </inkml:definitions>
-  <inkml:trace contextRef="#ctx0" brushRef="#br0">0 0 24575,'0'0'0</inkml:trace>
+  <inkml:trace contextRef="#ctx0" brushRef="#br0">20034 6454 24575,'0'0'0</inkml:trace>
+  <inkml:trace contextRef="#ctx0" brushRef="#br0" timeOffset="-2.14748E6">19948 8831 21169,'-92'-40'0,"1"-1"0,-1 1 0,1-1 0,0 1 0,-1 0 0,1-1 0,-1 1 0,1-1 0,0 1 0,-1-1 0,1 1 0,-1-1 0,1 1 0,0 0 0,-1-1 0,1 1 0,-1-1 0,1 1 0,0-1 0,-1 1 0,1-1 0,-1 1 0,1-1 0,0 1 0,-1 0 0,1-1 0,-1 1 0,1-1 0,0 1 0,-1-1 0,1 1 0,-1-1 0,1 1 0,0-1 0,-1 1 0,1 0 0,-1-1 0,1 1 0,0-1 0,-1 1 0,1-1 0,0 1 0,-1-1 0,1 1 0,-1-1 0,1 1 0,0 0 0,-1-1 0,1 1 0,-1-1 0,1 1 0,0-1 0,-1 1 0,1-1 0,-1 1 0,1 0 0,0-1 0,-1 1 0,1-1 0,-1 1 0,1-1 0,0 1 0,-1-1 0,1 1 0,-1-1 0,1 1 0,0 0 0,-1-1 0,1 1 0,-1-1 0,1 1 0,0-1 0,-1 1 0,1-1 0,-1 1 0,1-1 0,0 1 0,-1 0 0,1-1 0,-1 1 0,1-1 0,0 1 0,-1-1 0,1 1 0,-1-1 0,1 1 0,0-1 0,-1 1 0,1 0 0,-1-1 0,1 1 0,0-1 0,-1 1 0,1-1 0,-1 1 0,1-1 0,0 1 0,0 0 0,1 0 0,-1 0 0,0-1 0,0 1 0,0 0 0,0 0 0,1-1 0,-1 1 0,0 0 0,0 0 0,0 0 0,0-1 0,1 1 0,-1 0 0,0 0 0,0-1 0,0 1 0,0 0 0,1 0 0,-1 0 0,0-1 0,0 1 0,0 0 0,0 0 0,1-1 0,-1 1 0,0 0 0,0 0 0,0 0 0,0-1 0,0 1 0,1 0 0,-1 0 0,0-1 0,0 1 0,0 0 0,0 0 0,1 0 0,-1-1 0,0 1 0,0 0 0,0 0 0,0-1 0,1 1 0,-1 0 0,0 0 0,0 0 0,0-1 0,0 1 0,1 0 0,-1 0 0,0-1 0,0 1 0,0 0 0,0 0 0,1 0 0,-1-1 0,0 1 0,0 0 0,0 0 0,0-1 0,1 1 0,-1 0 0,0 0 0,0 0 0,0-1 0,0 1 0,1 0 0,-1 0 0,0-1 0,0 1 0,0 0 0,0 0 0,1 0 0,-1-1 0,0 1 0,0 0 0,0 0 0,0-1 0,1 1 0,-1 0 0,0 0 0,0 0 0,0-1 0,0 1 0,1 0 0,-1 0 0,0-1 0,0 1 0,0 0 0,0 0 0,1 0 0,-1-1 0,0 1 0,0 0 0,0 0 0,0 0 0,1-1 0,-1 1 0,0 0 0,0 0 0,0-1 0,0 1 0,1 0 0,-1 0 0,0 0 0,0-1 0,0 1 0,0 0 0,0 0 0,1-1 0,-1 1 0,0 0 0,0 0 0,0 0 0,0-1 0,1 1 0,-1 0 0,0 0 0,0-1 0</inkml:trace>
 </inkml:ink>
 </file>
 
@@ -12384,10 +12412,10 @@
         <mc:Choice xmlns:p14="http://schemas.microsoft.com/office/powerpoint/2010/main" Requires="p14">
           <p:contentPart p14:bwMode="auto" r:id="rId2">
             <p14:nvContentPartPr>
-              <p14:cNvPr id="99" name="잉크 98">
+              <p14:cNvPr id="100" name="잉크 99">
                 <a:extLst>
                   <a:ext uri="{FF2B5EF4-FFF2-40B4-BE49-F238E27FC236}">
-                    <a16:creationId xmlns:a16="http://schemas.microsoft.com/office/drawing/2014/main" id="{EBD90C02-FBBE-3F46-8DD7-FADBC36124BC}"/>
+                    <a16:creationId xmlns:a16="http://schemas.microsoft.com/office/drawing/2014/main" id="{2142FCD2-8C0E-8946-946E-54FFAE2EC513}"/>
                   </a:ext>
                 </a:extLst>
               </p14:cNvPr>
@@ -12395,7 +12423,7 @@
               <p14:nvPr/>
             </p14:nvContentPartPr>
             <p14:xfrm>
-              <a:off x="5874889" y="-326308"/>
+              <a:off x="7106089" y="5328572"/>
               <a:ext cx="360" cy="360"/>
             </p14:xfrm>
           </p:contentPart>
@@ -12403,10 +12431,10 @@
         <mc:Fallback>
           <p:pic>
             <p:nvPicPr>
-              <p:cNvPr id="99" name="잉크 98">
+              <p:cNvPr id="100" name="잉크 99">
                 <a:extLst>
                   <a:ext uri="{FF2B5EF4-FFF2-40B4-BE49-F238E27FC236}">
-                    <a16:creationId xmlns:a16="http://schemas.microsoft.com/office/drawing/2014/main" id="{EBD90C02-FBBE-3F46-8DD7-FADBC36124BC}"/>
+                    <a16:creationId xmlns:a16="http://schemas.microsoft.com/office/drawing/2014/main" id="{2142FCD2-8C0E-8946-946E-54FFAE2EC513}"/>
                   </a:ext>
                 </a:extLst>
               </p:cNvPr>
@@ -12421,8 +12449,59 @@
             </p:blipFill>
             <p:spPr>
               <a:xfrm>
-                <a:off x="5865889" y="-335308"/>
+                <a:off x="7097449" y="5319932"/>
                 <a:ext cx="18000" cy="18000"/>
+              </a:xfrm>
+              <a:prstGeom prst="rect">
+                <a:avLst/>
+              </a:prstGeom>
+            </p:spPr>
+          </p:pic>
+        </mc:Fallback>
+      </mc:AlternateContent>
+      <mc:AlternateContent xmlns:mc="http://schemas.openxmlformats.org/markup-compatibility/2006">
+        <mc:Choice xmlns:p14="http://schemas.microsoft.com/office/powerpoint/2010/main" Requires="p14">
+          <p:contentPart p14:bwMode="auto" r:id="rId4">
+            <p14:nvContentPartPr>
+              <p14:cNvPr id="102" name="잉크 101">
+                <a:extLst>
+                  <a:ext uri="{FF2B5EF4-FFF2-40B4-BE49-F238E27FC236}">
+                    <a16:creationId xmlns:a16="http://schemas.microsoft.com/office/drawing/2014/main" id="{3FB40230-D431-A340-A589-97ACF24FAEC7}"/>
+                  </a:ext>
+                </a:extLst>
+              </p14:cNvPr>
+              <p14:cNvContentPartPr/>
+              <p14:nvPr/>
+            </p14:nvContentPartPr>
+            <p14:xfrm>
+              <a:off x="-1337351" y="-2649748"/>
+              <a:ext cx="7212600" cy="3179520"/>
+            </p14:xfrm>
+          </p:contentPart>
+        </mc:Choice>
+        <mc:Fallback>
+          <p:pic>
+            <p:nvPicPr>
+              <p:cNvPr id="102" name="잉크 101">
+                <a:extLst>
+                  <a:ext uri="{FF2B5EF4-FFF2-40B4-BE49-F238E27FC236}">
+                    <a16:creationId xmlns:a16="http://schemas.microsoft.com/office/drawing/2014/main" id="{3FB40230-D431-A340-A589-97ACF24FAEC7}"/>
+                  </a:ext>
+                </a:extLst>
+              </p:cNvPr>
+              <p:cNvPicPr/>
+              <p:nvPr/>
+            </p:nvPicPr>
+            <p:blipFill>
+              <a:blip r:embed="rId5"/>
+              <a:stretch>
+                <a:fillRect/>
+              </a:stretch>
+            </p:blipFill>
+            <p:spPr>
+              <a:xfrm>
+                <a:off x="-1346351" y="-2658748"/>
+                <a:ext cx="7230240" cy="3197160"/>
               </a:xfrm>
               <a:prstGeom prst="rect">
                 <a:avLst/>

</xml_diff>

<commit_message>
add :  - data binding 2 추가  - 이미지 추가
</commit_message>
<xml_diff>
--- a/images.pptx
+++ b/images.pptx
@@ -13,6 +13,8 @@
     <p:sldId id="262" r:id="rId7"/>
     <p:sldId id="263" r:id="rId8"/>
     <p:sldId id="264" r:id="rId9"/>
+    <p:sldId id="265" r:id="rId10"/>
+    <p:sldId id="266" r:id="rId11"/>
   </p:sldIdLst>
   <p:sldSz cx="12192000" cy="6858000"/>
   <p:notesSz cx="6858000" cy="9144000"/>
@@ -111,6 +113,11 @@
       </a:defRPr>
     </a:lvl9pPr>
   </p:defaultTextStyle>
+  <p:extLst>
+    <p:ext uri="{EFAFB233-063F-42B5-8137-9DF3F51BA10A}">
+      <p15:sldGuideLst xmlns:p15="http://schemas.microsoft.com/office/powerpoint/2012/main"/>
+    </p:ext>
+  </p:extLst>
 </p:presentation>
 </file>
 
@@ -165,7 +172,7 @@
     </inkml:brush>
   </inkml:definitions>
   <inkml:trace contextRef="#ctx0" brushRef="#br0">20034 6454 24575,'0'0'0</inkml:trace>
-  <inkml:trace contextRef="#ctx0" brushRef="#br0" timeOffset="-2.14748E6">19948 8831 21169,'-92'-40'0,"1"-1"0,-1 1 0,1-1 0,0 1 0,-1 0 0,1-1 0,-1 1 0,1-1 0,0 1 0,-1-1 0,1 1 0,-1-1 0,1 1 0,0 0 0,-1-1 0,1 1 0,-1-1 0,1 1 0,0-1 0,-1 1 0,1-1 0,-1 1 0,1-1 0,0 1 0,-1 0 0,1-1 0,-1 1 0,1-1 0,0 1 0,-1-1 0,1 1 0,-1-1 0,1 1 0,0-1 0,-1 1 0,1 0 0,-1-1 0,1 1 0,0-1 0,-1 1 0,1-1 0,0 1 0,-1-1 0,1 1 0,-1-1 0,1 1 0,0 0 0,-1-1 0,1 1 0,-1-1 0,1 1 0,0-1 0,-1 1 0,1-1 0,-1 1 0,1 0 0,0-1 0,-1 1 0,1-1 0,-1 1 0,1-1 0,0 1 0,-1-1 0,1 1 0,-1-1 0,1 1 0,0 0 0,-1-1 0,1 1 0,-1-1 0,1 1 0,0-1 0,-1 1 0,1-1 0,-1 1 0,1-1 0,0 1 0,-1 0 0,1-1 0,-1 1 0,1-1 0,0 1 0,-1-1 0,1 1 0,-1-1 0,1 1 0,0-1 0,-1 1 0,1 0 0,-1-1 0,1 1 0,0-1 0,-1 1 0,1-1 0,-1 1 0,1-1 0,0 1 0,0 0 0,1 0 0,-1 0 0,0-1 0,0 1 0,0 0 0,0 0 0,1-1 0,-1 1 0,0 0 0,0 0 0,0 0 0,0-1 0,1 1 0,-1 0 0,0 0 0,0-1 0,0 1 0,0 0 0,1 0 0,-1 0 0,0-1 0,0 1 0,0 0 0,0 0 0,1-1 0,-1 1 0,0 0 0,0 0 0,0 0 0,0-1 0,0 1 0,1 0 0,-1 0 0,0-1 0,0 1 0,0 0 0,0 0 0,1 0 0,-1-1 0,0 1 0,0 0 0,0 0 0,0-1 0,1 1 0,-1 0 0,0 0 0,0 0 0,0-1 0,0 1 0,1 0 0,-1 0 0,0-1 0,0 1 0,0 0 0,0 0 0,1 0 0,-1-1 0,0 1 0,0 0 0,0 0 0,0-1 0,1 1 0,-1 0 0,0 0 0,0 0 0,0-1 0,0 1 0,1 0 0,-1 0 0,0-1 0,0 1 0,0 0 0,0 0 0,1 0 0,-1-1 0,0 1 0,0 0 0,0 0 0,0-1 0,1 1 0,-1 0 0,0 0 0,0 0 0,0-1 0,0 1 0,1 0 0,-1 0 0,0-1 0,0 1 0,0 0 0,0 0 0,1 0 0,-1-1 0,0 1 0,0 0 0,0 0 0,0 0 0,1-1 0,-1 1 0,0 0 0,0 0 0,0-1 0,0 1 0,1 0 0,-1 0 0,0 0 0,0-1 0,0 1 0,0 0 0,0 0 0,1-1 0,-1 1 0,0 0 0,0 0 0,0 0 0,0-1 0,1 1 0,-1 0 0,0 0 0,0-1 0</inkml:trace>
+  <inkml:trace contextRef="#ctx0" brushRef="#br0" timeOffset="3.647">19948 8831 21169,'-92'-40'0,"1"-1"0,-1 1 0,1-1 0,0 1 0,-1 0 0,1-1 0,-1 1 0,1-1 0,0 1 0,-1-1 0,1 1 0,-1-1 0,1 1 0,0 0 0,-1-1 0,1 1 0,-1-1 0,1 1 0,0-1 0,-1 1 0,1-1 0,-1 1 0,1-1 0,0 1 0,-1 0 0,1-1 0,-1 1 0,1-1 0,0 1 0,-1-1 0,1 1 0,-1-1 0,1 1 0,0-1 0,-1 1 0,1 0 0,-1-1 0,1 1 0,0-1 0,-1 1 0,1-1 0,0 1 0,-1-1 0,1 1 0,-1-1 0,1 1 0,0 0 0,-1-1 0,1 1 0,-1-1 0,1 1 0,0-1 0,-1 1 0,1-1 0,-1 1 0,1 0 0,0-1 0,-1 1 0,1-1 0,-1 1 0,1-1 0,0 1 0,-1-1 0,1 1 0,-1-1 0,1 1 0,0 0 0,-1-1 0,1 1 0,-1-1 0,1 1 0,0-1 0,-1 1 0,1-1 0,-1 1 0,1-1 0,0 1 0,-1 0 0,1-1 0,-1 1 0,1-1 0,0 1 0,-1-1 0,1 1 0,-1-1 0,1 1 0,0-1 0,-1 1 0,1 0 0,-1-1 0,1 1 0,0-1 0,-1 1 0,1-1 0,-1 1 0,1-1 0,0 1 0,0 0 0,1 0 0,-1 0 0,0-1 0,0 1 0,0 0 0,0 0 0,1-1 0,-1 1 0,0 0 0,0 0 0,0 0 0,0-1 0,1 1 0,-1 0 0,0 0 0,0-1 0,0 1 0,0 0 0,1 0 0,-1 0 0,0-1 0,0 1 0,0 0 0,0 0 0,1-1 0,-1 1 0,0 0 0,0 0 0,0 0 0,0-1 0,0 1 0,1 0 0,-1 0 0,0-1 0,0 1 0,0 0 0,0 0 0,1 0 0,-1-1 0,0 1 0,0 0 0,0 0 0,0-1 0,1 1 0,-1 0 0,0 0 0,0 0 0,0-1 0,0 1 0,1 0 0,-1 0 0,0-1 0,0 1 0,0 0 0,0 0 0,1 0 0,-1-1 0,0 1 0,0 0 0,0 0 0,0-1 0,1 1 0,-1 0 0,0 0 0,0 0 0,0-1 0,0 1 0,1 0 0,-1 0 0,0-1 0,0 1 0,0 0 0,0 0 0,1 0 0,-1-1 0,0 1 0,0 0 0,0 0 0,0-1 0,1 1 0,-1 0 0,0 0 0,0 0 0,0-1 0,0 1 0,1 0 0,-1 0 0,0-1 0,0 1 0,0 0 0,0 0 0,1 0 0,-1-1 0,0 1 0,0 0 0,0 0 0,0 0 0,1-1 0,-1 1 0,0 0 0,0 0 0,0-1 0,0 1 0,1 0 0,-1 0 0,0 0 0,0-1 0,0 1 0,0 0 0,0 0 0,1-1 0,-1 1 0,0 0 0,0 0 0,0 0 0,0-1 0,1 1 0,-1 0 0,0 0 0,0-1 0</inkml:trace>
 </inkml:ink>
 </file>
 
@@ -316,7 +323,7 @@
           <a:p>
             <a:fld id="{D005858E-A575-1742-AF3B-2E63F300D8DE}" type="datetimeFigureOut">
               <a:rPr kumimoji="1" lang="ko-KR" altLang="en-US" smtClean="0"/>
-              <a:t>2019. 4. 29.</a:t>
+              <a:t>2019. 5. 22.</a:t>
             </a:fld>
             <a:endParaRPr kumimoji="1" lang="ko-KR" altLang="en-US"/>
           </a:p>
@@ -489,7 +496,7 @@
           <a:p>
             <a:fld id="{D005858E-A575-1742-AF3B-2E63F300D8DE}" type="datetimeFigureOut">
               <a:rPr kumimoji="1" lang="ko-KR" altLang="en-US" smtClean="0"/>
-              <a:t>2019. 4. 29.</a:t>
+              <a:t>2019. 5. 22.</a:t>
             </a:fld>
             <a:endParaRPr kumimoji="1" lang="ko-KR" altLang="en-US"/>
           </a:p>
@@ -672,7 +679,7 @@
           <a:p>
             <a:fld id="{D005858E-A575-1742-AF3B-2E63F300D8DE}" type="datetimeFigureOut">
               <a:rPr kumimoji="1" lang="ko-KR" altLang="en-US" smtClean="0"/>
-              <a:t>2019. 4. 29.</a:t>
+              <a:t>2019. 5. 22.</a:t>
             </a:fld>
             <a:endParaRPr kumimoji="1" lang="ko-KR" altLang="en-US"/>
           </a:p>
@@ -845,7 +852,7 @@
           <a:p>
             <a:fld id="{D005858E-A575-1742-AF3B-2E63F300D8DE}" type="datetimeFigureOut">
               <a:rPr kumimoji="1" lang="ko-KR" altLang="en-US" smtClean="0"/>
-              <a:t>2019. 4. 29.</a:t>
+              <a:t>2019. 5. 22.</a:t>
             </a:fld>
             <a:endParaRPr kumimoji="1" lang="ko-KR" altLang="en-US"/>
           </a:p>
@@ -1123,7 +1130,7 @@
           <a:p>
             <a:fld id="{D005858E-A575-1742-AF3B-2E63F300D8DE}" type="datetimeFigureOut">
               <a:rPr kumimoji="1" lang="ko-KR" altLang="en-US" smtClean="0"/>
-              <a:t>2019. 4. 29.</a:t>
+              <a:t>2019. 5. 22.</a:t>
             </a:fld>
             <a:endParaRPr kumimoji="1" lang="ko-KR" altLang="en-US"/>
           </a:p>
@@ -1338,7 +1345,7 @@
           <a:p>
             <a:fld id="{D005858E-A575-1742-AF3B-2E63F300D8DE}" type="datetimeFigureOut">
               <a:rPr kumimoji="1" lang="ko-KR" altLang="en-US" smtClean="0"/>
-              <a:t>2019. 4. 29.</a:t>
+              <a:t>2019. 5. 22.</a:t>
             </a:fld>
             <a:endParaRPr kumimoji="1" lang="ko-KR" altLang="en-US"/>
           </a:p>
@@ -1706,7 +1713,7 @@
           <a:p>
             <a:fld id="{D005858E-A575-1742-AF3B-2E63F300D8DE}" type="datetimeFigureOut">
               <a:rPr kumimoji="1" lang="ko-KR" altLang="en-US" smtClean="0"/>
-              <a:t>2019. 4. 29.</a:t>
+              <a:t>2019. 5. 22.</a:t>
             </a:fld>
             <a:endParaRPr kumimoji="1" lang="ko-KR" altLang="en-US"/>
           </a:p>
@@ -1847,7 +1854,7 @@
           <a:p>
             <a:fld id="{D005858E-A575-1742-AF3B-2E63F300D8DE}" type="datetimeFigureOut">
               <a:rPr kumimoji="1" lang="ko-KR" altLang="en-US" smtClean="0"/>
-              <a:t>2019. 4. 29.</a:t>
+              <a:t>2019. 5. 22.</a:t>
             </a:fld>
             <a:endParaRPr kumimoji="1" lang="ko-KR" altLang="en-US"/>
           </a:p>
@@ -1960,7 +1967,7 @@
           <a:p>
             <a:fld id="{D005858E-A575-1742-AF3B-2E63F300D8DE}" type="datetimeFigureOut">
               <a:rPr kumimoji="1" lang="ko-KR" altLang="en-US" smtClean="0"/>
-              <a:t>2019. 4. 29.</a:t>
+              <a:t>2019. 5. 22.</a:t>
             </a:fld>
             <a:endParaRPr kumimoji="1" lang="ko-KR" altLang="en-US"/>
           </a:p>
@@ -2249,7 +2256,7 @@
           <a:p>
             <a:fld id="{D005858E-A575-1742-AF3B-2E63F300D8DE}" type="datetimeFigureOut">
               <a:rPr kumimoji="1" lang="ko-KR" altLang="en-US" smtClean="0"/>
-              <a:t>2019. 4. 29.</a:t>
+              <a:t>2019. 5. 22.</a:t>
             </a:fld>
             <a:endParaRPr kumimoji="1" lang="ko-KR" altLang="en-US"/>
           </a:p>
@@ -2540,7 +2547,7 @@
           <a:p>
             <a:fld id="{D005858E-A575-1742-AF3B-2E63F300D8DE}" type="datetimeFigureOut">
               <a:rPr kumimoji="1" lang="ko-KR" altLang="en-US" smtClean="0"/>
-              <a:t>2019. 4. 29.</a:t>
+              <a:t>2019. 5. 22.</a:t>
             </a:fld>
             <a:endParaRPr kumimoji="1" lang="ko-KR" altLang="en-US"/>
           </a:p>
@@ -2756,7 +2763,7 @@
           <a:p>
             <a:fld id="{D005858E-A575-1742-AF3B-2E63F300D8DE}" type="datetimeFigureOut">
               <a:rPr kumimoji="1" lang="ko-KR" altLang="en-US" smtClean="0"/>
-              <a:t>2019. 4. 29.</a:t>
+              <a:t>2019. 5. 22.</a:t>
             </a:fld>
             <a:endParaRPr kumimoji="1" lang="ko-KR" altLang="en-US"/>
           </a:p>
@@ -3984,6 +3991,76 @@
 </p:sld>
 </file>
 
+<file path=ppt/slides/slide10.xml><?xml version="1.0" encoding="utf-8"?>
+<p:sld xmlns:a="http://schemas.openxmlformats.org/drawingml/2006/main" xmlns:r="http://schemas.openxmlformats.org/officeDocument/2006/relationships" xmlns:p="http://schemas.openxmlformats.org/presentationml/2006/main">
+  <p:cSld>
+    <p:spTree>
+      <p:nvGrpSpPr>
+        <p:cNvPr id="1" name=""/>
+        <p:cNvGrpSpPr/>
+        <p:nvPr/>
+      </p:nvGrpSpPr>
+      <p:grpSpPr>
+        <a:xfrm>
+          <a:off x="0" y="0"/>
+          <a:ext cx="0" cy="0"/>
+          <a:chOff x="0" y="0"/>
+          <a:chExt cx="0" cy="0"/>
+        </a:xfrm>
+      </p:grpSpPr>
+      <p:sp>
+        <p:nvSpPr>
+          <p:cNvPr id="38" name="TextBox 37">
+            <a:extLst>
+              <a:ext uri="{FF2B5EF4-FFF2-40B4-BE49-F238E27FC236}">
+                <a16:creationId xmlns:a16="http://schemas.microsoft.com/office/drawing/2014/main" id="{41C7FBC6-1ADE-614B-A639-CE04E73D33B6}"/>
+              </a:ext>
+            </a:extLst>
+          </p:cNvPr>
+          <p:cNvSpPr txBox="1"/>
+          <p:nvPr/>
+        </p:nvSpPr>
+        <p:spPr>
+          <a:xfrm>
+            <a:off x="163546" y="236746"/>
+            <a:ext cx="2457006" cy="276999"/>
+          </a:xfrm>
+          <a:prstGeom prst="rect">
+            <a:avLst/>
+          </a:prstGeom>
+          <a:noFill/>
+        </p:spPr>
+        <p:txBody>
+          <a:bodyPr wrap="square" rtlCol="0">
+            <a:spAutoFit/>
+          </a:bodyPr>
+          <a:lstStyle/>
+          <a:p>
+            <a:r>
+              <a:rPr kumimoji="1" lang="en-US" altLang="ko-KR" sz="1200" dirty="0" err="1"/>
+              <a:t>Mvc</a:t>
+            </a:r>
+            <a:r>
+              <a:rPr kumimoji="1" lang="en-US" altLang="ko-KR" sz="1200" dirty="0"/>
+              <a:t> flow of control</a:t>
+            </a:r>
+            <a:endParaRPr kumimoji="1" lang="ko-KR" altLang="en-US" sz="1200" dirty="0"/>
+          </a:p>
+        </p:txBody>
+      </p:sp>
+    </p:spTree>
+    <p:extLst>
+      <p:ext uri="{BB962C8B-B14F-4D97-AF65-F5344CB8AC3E}">
+        <p14:creationId xmlns:p14="http://schemas.microsoft.com/office/powerpoint/2010/main" val="495873685"/>
+      </p:ext>
+    </p:extLst>
+  </p:cSld>
+  <p:clrMapOvr>
+    <a:masterClrMapping/>
+  </p:clrMapOvr>
+</p:sld>
+</file>
+
 <file path=ppt/slides/slide2.xml><?xml version="1.0" encoding="utf-8"?>
 <p:sld xmlns:a="http://schemas.openxmlformats.org/drawingml/2006/main" xmlns:r="http://schemas.openxmlformats.org/officeDocument/2006/relationships" xmlns:p="http://schemas.openxmlformats.org/presentationml/2006/main">
   <p:cSld>
@@ -12408,8 +12485,8 @@
           </a:p>
         </p:txBody>
       </p:sp>
-      <mc:AlternateContent xmlns:mc="http://schemas.openxmlformats.org/markup-compatibility/2006">
-        <mc:Choice xmlns:p14="http://schemas.microsoft.com/office/powerpoint/2010/main" Requires="p14">
+      <mc:AlternateContent xmlns:mc="http://schemas.openxmlformats.org/markup-compatibility/2006" xmlns:p14="http://schemas.microsoft.com/office/powerpoint/2010/main">
+        <mc:Choice Requires="p14">
           <p:contentPart p14:bwMode="auto" r:id="rId2">
             <p14:nvContentPartPr>
               <p14:cNvPr id="100" name="잉크 99">
@@ -12428,7 +12505,7 @@
             </p14:xfrm>
           </p:contentPart>
         </mc:Choice>
-        <mc:Fallback>
+        <mc:Fallback xmlns="">
           <p:pic>
             <p:nvPicPr>
               <p:cNvPr id="100" name="잉크 99">
@@ -12459,8 +12536,8 @@
           </p:pic>
         </mc:Fallback>
       </mc:AlternateContent>
-      <mc:AlternateContent xmlns:mc="http://schemas.openxmlformats.org/markup-compatibility/2006">
-        <mc:Choice xmlns:p14="http://schemas.microsoft.com/office/powerpoint/2010/main" Requires="p14">
+      <mc:AlternateContent xmlns:mc="http://schemas.openxmlformats.org/markup-compatibility/2006" xmlns:p14="http://schemas.microsoft.com/office/powerpoint/2010/main">
+        <mc:Choice Requires="p14">
           <p:contentPart p14:bwMode="auto" r:id="rId4">
             <p14:nvContentPartPr>
               <p14:cNvPr id="102" name="잉크 101">
@@ -12479,7 +12556,7 @@
             </p14:xfrm>
           </p:contentPart>
         </mc:Choice>
-        <mc:Fallback>
+        <mc:Fallback xmlns="">
           <p:pic>
             <p:nvPicPr>
               <p:cNvPr id="102" name="잉크 101">
@@ -12514,6 +12591,333 @@
     <p:extLst>
       <p:ext uri="{BB962C8B-B14F-4D97-AF65-F5344CB8AC3E}">
         <p14:creationId xmlns:p14="http://schemas.microsoft.com/office/powerpoint/2010/main" val="4073073301"/>
+      </p:ext>
+    </p:extLst>
+  </p:cSld>
+  <p:clrMapOvr>
+    <a:masterClrMapping/>
+  </p:clrMapOvr>
+</p:sld>
+</file>
+
+<file path=ppt/slides/slide9.xml><?xml version="1.0" encoding="utf-8"?>
+<p:sld xmlns:a="http://schemas.openxmlformats.org/drawingml/2006/main" xmlns:r="http://schemas.openxmlformats.org/officeDocument/2006/relationships" xmlns:p="http://schemas.openxmlformats.org/presentationml/2006/main">
+  <p:cSld>
+    <p:spTree>
+      <p:nvGrpSpPr>
+        <p:cNvPr id="1" name=""/>
+        <p:cNvGrpSpPr/>
+        <p:nvPr/>
+      </p:nvGrpSpPr>
+      <p:grpSpPr>
+        <a:xfrm>
+          <a:off x="0" y="0"/>
+          <a:ext cx="0" cy="0"/>
+          <a:chOff x="0" y="0"/>
+          <a:chExt cx="0" cy="0"/>
+        </a:xfrm>
+      </p:grpSpPr>
+      <p:sp>
+        <p:nvSpPr>
+          <p:cNvPr id="38" name="TextBox 37">
+            <a:extLst>
+              <a:ext uri="{FF2B5EF4-FFF2-40B4-BE49-F238E27FC236}">
+                <a16:creationId xmlns:a16="http://schemas.microsoft.com/office/drawing/2014/main" id="{41C7FBC6-1ADE-614B-A639-CE04E73D33B6}"/>
+              </a:ext>
+            </a:extLst>
+          </p:cNvPr>
+          <p:cNvSpPr txBox="1"/>
+          <p:nvPr/>
+        </p:nvSpPr>
+        <p:spPr>
+          <a:xfrm>
+            <a:off x="163546" y="236746"/>
+            <a:ext cx="2457006" cy="276999"/>
+          </a:xfrm>
+          <a:prstGeom prst="rect">
+            <a:avLst/>
+          </a:prstGeom>
+          <a:noFill/>
+        </p:spPr>
+        <p:txBody>
+          <a:bodyPr wrap="square" rtlCol="0">
+            <a:spAutoFit/>
+          </a:bodyPr>
+          <a:lstStyle/>
+          <a:p>
+            <a:r>
+              <a:rPr kumimoji="1" lang="en-US" altLang="ko-KR" sz="1200"/>
+              <a:t>Proxy</a:t>
+            </a:r>
+            <a:endParaRPr kumimoji="1" lang="ko-KR" altLang="en-US" sz="1200" dirty="0"/>
+          </a:p>
+        </p:txBody>
+      </p:sp>
+      <p:sp>
+        <p:nvSpPr>
+          <p:cNvPr id="44" name="직사각형 43">
+            <a:extLst>
+              <a:ext uri="{FF2B5EF4-FFF2-40B4-BE49-F238E27FC236}">
+                <a16:creationId xmlns:a16="http://schemas.microsoft.com/office/drawing/2014/main" id="{C0BDFB42-C377-594E-B6FE-9DBE44B95F1B}"/>
+              </a:ext>
+            </a:extLst>
+          </p:cNvPr>
+          <p:cNvSpPr/>
+          <p:nvPr/>
+        </p:nvSpPr>
+        <p:spPr>
+          <a:xfrm>
+            <a:off x="2494879" y="2651275"/>
+            <a:ext cx="3268588" cy="2282533"/>
+          </a:xfrm>
+          <a:prstGeom prst="rect">
+            <a:avLst/>
+          </a:prstGeom>
+          <a:noFill/>
+          <a:ln>
+            <a:solidFill>
+              <a:schemeClr val="tx1"/>
+            </a:solidFill>
+          </a:ln>
+        </p:spPr>
+        <p:style>
+          <a:lnRef idx="2">
+            <a:schemeClr val="accent1">
+              <a:shade val="50000"/>
+            </a:schemeClr>
+          </a:lnRef>
+          <a:fillRef idx="1">
+            <a:schemeClr val="accent1"/>
+          </a:fillRef>
+          <a:effectRef idx="0">
+            <a:schemeClr val="accent1"/>
+          </a:effectRef>
+          <a:fontRef idx="minor">
+            <a:schemeClr val="lt1"/>
+          </a:fontRef>
+        </p:style>
+        <p:txBody>
+          <a:bodyPr rtlCol="0" anchor="ctr"/>
+          <a:lstStyle/>
+          <a:p>
+            <a:pPr algn="ctr"/>
+            <a:r>
+              <a:rPr kumimoji="1" lang="en-US" altLang="ko-KR" dirty="0">
+                <a:solidFill>
+                  <a:schemeClr val="tx1"/>
+                </a:solidFill>
+              </a:rPr>
+              <a:t>Proxy</a:t>
+            </a:r>
+          </a:p>
+          <a:p>
+            <a:pPr algn="ctr"/>
+            <a:endParaRPr kumimoji="1" lang="en-US" altLang="ko-KR" dirty="0">
+              <a:solidFill>
+                <a:schemeClr val="tx1"/>
+              </a:solidFill>
+            </a:endParaRPr>
+          </a:p>
+          <a:p>
+            <a:pPr algn="ctr"/>
+            <a:endParaRPr kumimoji="1" lang="en-US" altLang="ko-KR" dirty="0">
+              <a:solidFill>
+                <a:schemeClr val="tx1"/>
+              </a:solidFill>
+            </a:endParaRPr>
+          </a:p>
+          <a:p>
+            <a:pPr algn="ctr"/>
+            <a:endParaRPr kumimoji="1" lang="en-US" altLang="ko-KR" dirty="0">
+              <a:solidFill>
+                <a:schemeClr val="tx1"/>
+              </a:solidFill>
+            </a:endParaRPr>
+          </a:p>
+          <a:p>
+            <a:pPr algn="ctr"/>
+            <a:endParaRPr kumimoji="1" lang="en-US" altLang="ko-KR" dirty="0">
+              <a:solidFill>
+                <a:schemeClr val="tx1"/>
+              </a:solidFill>
+            </a:endParaRPr>
+          </a:p>
+          <a:p>
+            <a:pPr algn="ctr"/>
+            <a:endParaRPr kumimoji="1" lang="en-US" altLang="ko-KR" dirty="0">
+              <a:solidFill>
+                <a:schemeClr val="tx1"/>
+              </a:solidFill>
+            </a:endParaRPr>
+          </a:p>
+        </p:txBody>
+      </p:sp>
+      <p:sp>
+        <p:nvSpPr>
+          <p:cNvPr id="43" name="직사각형 42">
+            <a:extLst>
+              <a:ext uri="{FF2B5EF4-FFF2-40B4-BE49-F238E27FC236}">
+                <a16:creationId xmlns:a16="http://schemas.microsoft.com/office/drawing/2014/main" id="{0CFA07B5-4454-B847-AF9A-C97F69753A88}"/>
+              </a:ext>
+            </a:extLst>
+          </p:cNvPr>
+          <p:cNvSpPr/>
+          <p:nvPr/>
+        </p:nvSpPr>
+        <p:spPr>
+          <a:xfrm>
+            <a:off x="7336463" y="3091508"/>
+            <a:ext cx="2106096" cy="1402065"/>
+          </a:xfrm>
+          <a:prstGeom prst="rect">
+            <a:avLst/>
+          </a:prstGeom>
+          <a:noFill/>
+          <a:ln>
+            <a:solidFill>
+              <a:schemeClr val="tx1"/>
+            </a:solidFill>
+          </a:ln>
+        </p:spPr>
+        <p:style>
+          <a:lnRef idx="2">
+            <a:schemeClr val="accent1">
+              <a:shade val="50000"/>
+            </a:schemeClr>
+          </a:lnRef>
+          <a:fillRef idx="1">
+            <a:schemeClr val="accent1"/>
+          </a:fillRef>
+          <a:effectRef idx="0">
+            <a:schemeClr val="accent1"/>
+          </a:effectRef>
+          <a:fontRef idx="minor">
+            <a:schemeClr val="lt1"/>
+          </a:fontRef>
+        </p:style>
+        <p:txBody>
+          <a:bodyPr rtlCol="0" anchor="ctr"/>
+          <a:lstStyle/>
+          <a:p>
+            <a:pPr algn="ctr"/>
+            <a:r>
+              <a:rPr kumimoji="1" lang="en-US" altLang="ko-KR" dirty="0">
+                <a:solidFill>
+                  <a:schemeClr val="tx1"/>
+                </a:solidFill>
+              </a:rPr>
+              <a:t>Singleton</a:t>
+            </a:r>
+          </a:p>
+        </p:txBody>
+      </p:sp>
+      <p:sp>
+        <p:nvSpPr>
+          <p:cNvPr id="45" name="직사각형 44">
+            <a:extLst>
+              <a:ext uri="{FF2B5EF4-FFF2-40B4-BE49-F238E27FC236}">
+                <a16:creationId xmlns:a16="http://schemas.microsoft.com/office/drawing/2014/main" id="{A3C94757-2F75-B441-ABE9-4A5D02949BB5}"/>
+              </a:ext>
+            </a:extLst>
+          </p:cNvPr>
+          <p:cNvSpPr/>
+          <p:nvPr/>
+        </p:nvSpPr>
+        <p:spPr>
+          <a:xfrm>
+            <a:off x="3270097" y="3514060"/>
+            <a:ext cx="1718152" cy="918097"/>
+          </a:xfrm>
+          <a:prstGeom prst="rect">
+            <a:avLst/>
+          </a:prstGeom>
+          <a:noFill/>
+          <a:ln>
+            <a:solidFill>
+              <a:schemeClr val="tx1"/>
+            </a:solidFill>
+          </a:ln>
+        </p:spPr>
+        <p:style>
+          <a:lnRef idx="2">
+            <a:schemeClr val="accent1">
+              <a:shade val="50000"/>
+            </a:schemeClr>
+          </a:lnRef>
+          <a:fillRef idx="1">
+            <a:schemeClr val="accent1"/>
+          </a:fillRef>
+          <a:effectRef idx="0">
+            <a:schemeClr val="accent1"/>
+          </a:effectRef>
+          <a:fontRef idx="minor">
+            <a:schemeClr val="lt1"/>
+          </a:fontRef>
+        </p:style>
+        <p:txBody>
+          <a:bodyPr rtlCol="0" anchor="ctr"/>
+          <a:lstStyle/>
+          <a:p>
+            <a:pPr algn="ctr"/>
+            <a:r>
+              <a:rPr kumimoji="1" lang="en-US" altLang="ko-KR" dirty="0">
+                <a:solidFill>
+                  <a:schemeClr val="tx1"/>
+                </a:solidFill>
+              </a:rPr>
+              <a:t>Prototype</a:t>
+            </a:r>
+          </a:p>
+        </p:txBody>
+      </p:sp>
+      <p:cxnSp>
+        <p:nvCxnSpPr>
+          <p:cNvPr id="48" name="직선 화살표 연결선 47">
+            <a:extLst>
+              <a:ext uri="{FF2B5EF4-FFF2-40B4-BE49-F238E27FC236}">
+                <a16:creationId xmlns:a16="http://schemas.microsoft.com/office/drawing/2014/main" id="{51087F3C-A954-2B4F-B10B-15859DD2E455}"/>
+              </a:ext>
+            </a:extLst>
+          </p:cNvPr>
+          <p:cNvCxnSpPr>
+            <a:cxnSpLocks/>
+            <a:stCxn id="44" idx="3"/>
+            <a:endCxn id="43" idx="1"/>
+          </p:cNvCxnSpPr>
+          <p:nvPr/>
+        </p:nvCxnSpPr>
+        <p:spPr>
+          <a:xfrm flipV="1">
+            <a:off x="5763467" y="3792541"/>
+            <a:ext cx="1572996" cy="1"/>
+          </a:xfrm>
+          <a:prstGeom prst="straightConnector1">
+            <a:avLst/>
+          </a:prstGeom>
+          <a:ln w="34925">
+            <a:headEnd type="triangle"/>
+            <a:tailEnd type="none"/>
+          </a:ln>
+        </p:spPr>
+        <p:style>
+          <a:lnRef idx="1">
+            <a:schemeClr val="accent1"/>
+          </a:lnRef>
+          <a:fillRef idx="0">
+            <a:schemeClr val="accent1"/>
+          </a:fillRef>
+          <a:effectRef idx="0">
+            <a:schemeClr val="accent1"/>
+          </a:effectRef>
+          <a:fontRef idx="minor">
+            <a:schemeClr val="tx1"/>
+          </a:fontRef>
+        </p:style>
+      </p:cxnSp>
+    </p:spTree>
+    <p:extLst>
+      <p:ext uri="{BB962C8B-B14F-4D97-AF65-F5344CB8AC3E}">
+        <p14:creationId xmlns:p14="http://schemas.microsoft.com/office/powerpoint/2010/main" val="4218617275"/>
       </p:ext>
     </p:extLst>
   </p:cSld>

</xml_diff>

<commit_message>
add :  - aop 추가 및 image 추가
</commit_message>
<xml_diff>
--- a/images.pptx
+++ b/images.pptx
@@ -15,6 +15,8 @@
     <p:sldId id="264" r:id="rId9"/>
     <p:sldId id="265" r:id="rId10"/>
     <p:sldId id="266" r:id="rId11"/>
+    <p:sldId id="267" r:id="rId12"/>
+    <p:sldId id="268" r:id="rId13"/>
   </p:sldIdLst>
   <p:sldSz cx="12192000" cy="6858000"/>
   <p:notesSz cx="6858000" cy="9144000"/>
@@ -4023,7 +4025,7 @@
         <p:spPr>
           <a:xfrm>
             <a:off x="163546" y="236746"/>
-            <a:ext cx="2457006" cy="276999"/>
+            <a:ext cx="2457006" cy="461665"/>
           </a:xfrm>
           <a:prstGeom prst="rect">
             <a:avLst/>
@@ -4037,21 +4039,1183 @@
           <a:lstStyle/>
           <a:p>
             <a:r>
-              <a:rPr kumimoji="1" lang="en-US" altLang="ko-KR" sz="1200" dirty="0" err="1"/>
-              <a:t>Mvc</a:t>
-            </a:r>
-            <a:r>
-              <a:rPr kumimoji="1" lang="en-US" altLang="ko-KR" sz="1200" dirty="0"/>
-              <a:t> flow of control</a:t>
-            </a:r>
-            <a:endParaRPr kumimoji="1" lang="ko-KR" altLang="en-US" sz="1200" dirty="0"/>
-          </a:p>
-        </p:txBody>
-      </p:sp>
+              <a:rPr lang="en-US" altLang="ko-KR" sz="1200" dirty="0" err="1"/>
+              <a:t>DefaultFormattingConversionService</a:t>
+            </a:r>
+            <a:endParaRPr lang="en-US" altLang="ko-KR" sz="1200" dirty="0"/>
+          </a:p>
+        </p:txBody>
+      </p:sp>
+      <p:sp>
+        <p:nvSpPr>
+          <p:cNvPr id="7" name="직사각형 6">
+            <a:extLst>
+              <a:ext uri="{FF2B5EF4-FFF2-40B4-BE49-F238E27FC236}">
+                <a16:creationId xmlns:a16="http://schemas.microsoft.com/office/drawing/2014/main" id="{54DB438E-71B1-364D-8968-D0DC3EDADE66}"/>
+              </a:ext>
+            </a:extLst>
+          </p:cNvPr>
+          <p:cNvSpPr/>
+          <p:nvPr/>
+        </p:nvSpPr>
+        <p:spPr>
+          <a:xfrm>
+            <a:off x="4047016" y="2947416"/>
+            <a:ext cx="2024600" cy="914400"/>
+          </a:xfrm>
+          <a:prstGeom prst="rect">
+            <a:avLst/>
+          </a:prstGeom>
+          <a:noFill/>
+          <a:ln>
+            <a:solidFill>
+              <a:schemeClr val="tx1"/>
+            </a:solidFill>
+          </a:ln>
+        </p:spPr>
+        <p:style>
+          <a:lnRef idx="2">
+            <a:schemeClr val="accent1">
+              <a:shade val="50000"/>
+            </a:schemeClr>
+          </a:lnRef>
+          <a:fillRef idx="1">
+            <a:schemeClr val="accent1"/>
+          </a:fillRef>
+          <a:effectRef idx="0">
+            <a:schemeClr val="accent1"/>
+          </a:effectRef>
+          <a:fontRef idx="minor">
+            <a:schemeClr val="lt1"/>
+          </a:fontRef>
+        </p:style>
+        <p:txBody>
+          <a:bodyPr rtlCol="0" anchor="ctr"/>
+          <a:lstStyle/>
+          <a:p>
+            <a:pPr algn="ctr"/>
+            <a:r>
+              <a:rPr kumimoji="1" lang="en-US" altLang="ko-KR" dirty="0">
+                <a:solidFill>
+                  <a:schemeClr val="tx1"/>
+                </a:solidFill>
+              </a:rPr>
+              <a:t>Conversion</a:t>
+            </a:r>
+          </a:p>
+          <a:p>
+            <a:pPr algn="ctr"/>
+            <a:r>
+              <a:rPr kumimoji="1" lang="en-US" altLang="ko-KR" dirty="0">
+                <a:solidFill>
+                  <a:schemeClr val="tx1"/>
+                </a:solidFill>
+              </a:rPr>
+              <a:t>Service</a:t>
+            </a:r>
+          </a:p>
+        </p:txBody>
+      </p:sp>
+      <p:sp>
+        <p:nvSpPr>
+          <p:cNvPr id="8" name="직사각형 7">
+            <a:extLst>
+              <a:ext uri="{FF2B5EF4-FFF2-40B4-BE49-F238E27FC236}">
+                <a16:creationId xmlns:a16="http://schemas.microsoft.com/office/drawing/2014/main" id="{DB6E7846-B735-FD4E-8CC6-8E641E42DBF2}"/>
+              </a:ext>
+            </a:extLst>
+          </p:cNvPr>
+          <p:cNvSpPr/>
+          <p:nvPr/>
+        </p:nvSpPr>
+        <p:spPr>
+          <a:xfrm>
+            <a:off x="6680490" y="2947416"/>
+            <a:ext cx="2024600" cy="914400"/>
+          </a:xfrm>
+          <a:prstGeom prst="rect">
+            <a:avLst/>
+          </a:prstGeom>
+          <a:noFill/>
+          <a:ln>
+            <a:solidFill>
+              <a:schemeClr val="tx1"/>
+            </a:solidFill>
+          </a:ln>
+        </p:spPr>
+        <p:style>
+          <a:lnRef idx="2">
+            <a:schemeClr val="accent1">
+              <a:shade val="50000"/>
+            </a:schemeClr>
+          </a:lnRef>
+          <a:fillRef idx="1">
+            <a:schemeClr val="accent1"/>
+          </a:fillRef>
+          <a:effectRef idx="0">
+            <a:schemeClr val="accent1"/>
+          </a:effectRef>
+          <a:fontRef idx="minor">
+            <a:schemeClr val="lt1"/>
+          </a:fontRef>
+        </p:style>
+        <p:txBody>
+          <a:bodyPr rtlCol="0" anchor="ctr"/>
+          <a:lstStyle/>
+          <a:p>
+            <a:pPr algn="ctr"/>
+            <a:r>
+              <a:rPr kumimoji="1" lang="en-US" altLang="ko-KR" dirty="0">
+                <a:solidFill>
+                  <a:schemeClr val="tx1"/>
+                </a:solidFill>
+              </a:rPr>
+              <a:t>Formatter</a:t>
+            </a:r>
+          </a:p>
+          <a:p>
+            <a:pPr algn="ctr"/>
+            <a:r>
+              <a:rPr kumimoji="1" lang="en-US" altLang="ko-KR" dirty="0">
+                <a:solidFill>
+                  <a:schemeClr val="tx1"/>
+                </a:solidFill>
+              </a:rPr>
+              <a:t>Registry</a:t>
+            </a:r>
+          </a:p>
+        </p:txBody>
+      </p:sp>
+      <p:sp>
+        <p:nvSpPr>
+          <p:cNvPr id="9" name="직사각형 8">
+            <a:extLst>
+              <a:ext uri="{FF2B5EF4-FFF2-40B4-BE49-F238E27FC236}">
+                <a16:creationId xmlns:a16="http://schemas.microsoft.com/office/drawing/2014/main" id="{30454B3F-F908-BC4D-90A1-B390A7D4A8C2}"/>
+              </a:ext>
+            </a:extLst>
+          </p:cNvPr>
+          <p:cNvSpPr/>
+          <p:nvPr/>
+        </p:nvSpPr>
+        <p:spPr>
+          <a:xfrm>
+            <a:off x="6680490" y="1636776"/>
+            <a:ext cx="2024600" cy="914400"/>
+          </a:xfrm>
+          <a:prstGeom prst="rect">
+            <a:avLst/>
+          </a:prstGeom>
+          <a:noFill/>
+          <a:ln>
+            <a:solidFill>
+              <a:schemeClr val="tx1"/>
+            </a:solidFill>
+          </a:ln>
+        </p:spPr>
+        <p:style>
+          <a:lnRef idx="2">
+            <a:schemeClr val="accent1">
+              <a:shade val="50000"/>
+            </a:schemeClr>
+          </a:lnRef>
+          <a:fillRef idx="1">
+            <a:schemeClr val="accent1"/>
+          </a:fillRef>
+          <a:effectRef idx="0">
+            <a:schemeClr val="accent1"/>
+          </a:effectRef>
+          <a:fontRef idx="minor">
+            <a:schemeClr val="lt1"/>
+          </a:fontRef>
+        </p:style>
+        <p:txBody>
+          <a:bodyPr rtlCol="0" anchor="ctr"/>
+          <a:lstStyle/>
+          <a:p>
+            <a:pPr algn="ctr"/>
+            <a:r>
+              <a:rPr kumimoji="1" lang="en-US" altLang="ko-KR" dirty="0">
+                <a:solidFill>
+                  <a:schemeClr val="tx1"/>
+                </a:solidFill>
+              </a:rPr>
+              <a:t>Converter</a:t>
+            </a:r>
+          </a:p>
+          <a:p>
+            <a:pPr algn="ctr"/>
+            <a:r>
+              <a:rPr kumimoji="1" lang="en-US" altLang="ko-KR" dirty="0">
+                <a:solidFill>
+                  <a:schemeClr val="tx1"/>
+                </a:solidFill>
+              </a:rPr>
+              <a:t>Registry</a:t>
+            </a:r>
+          </a:p>
+        </p:txBody>
+      </p:sp>
+      <p:sp>
+        <p:nvSpPr>
+          <p:cNvPr id="10" name="직사각형 9">
+            <a:extLst>
+              <a:ext uri="{FF2B5EF4-FFF2-40B4-BE49-F238E27FC236}">
+                <a16:creationId xmlns:a16="http://schemas.microsoft.com/office/drawing/2014/main" id="{BCC4D554-E0D9-1B41-9CAE-20C0E26F2203}"/>
+              </a:ext>
+            </a:extLst>
+          </p:cNvPr>
+          <p:cNvSpPr/>
+          <p:nvPr/>
+        </p:nvSpPr>
+        <p:spPr>
+          <a:xfrm>
+            <a:off x="4964467" y="4453128"/>
+            <a:ext cx="2871942" cy="914400"/>
+          </a:xfrm>
+          <a:prstGeom prst="rect">
+            <a:avLst/>
+          </a:prstGeom>
+          <a:noFill/>
+          <a:ln>
+            <a:solidFill>
+              <a:schemeClr val="tx1"/>
+            </a:solidFill>
+          </a:ln>
+        </p:spPr>
+        <p:style>
+          <a:lnRef idx="2">
+            <a:schemeClr val="accent1">
+              <a:shade val="50000"/>
+            </a:schemeClr>
+          </a:lnRef>
+          <a:fillRef idx="1">
+            <a:schemeClr val="accent1"/>
+          </a:fillRef>
+          <a:effectRef idx="0">
+            <a:schemeClr val="accent1"/>
+          </a:effectRef>
+          <a:fontRef idx="minor">
+            <a:schemeClr val="lt1"/>
+          </a:fontRef>
+        </p:style>
+        <p:txBody>
+          <a:bodyPr rtlCol="0" anchor="ctr"/>
+          <a:lstStyle/>
+          <a:p>
+            <a:pPr algn="ctr"/>
+            <a:r>
+              <a:rPr lang="en-US" altLang="ko-KR" dirty="0" err="1">
+                <a:solidFill>
+                  <a:schemeClr val="tx1"/>
+                </a:solidFill>
+              </a:rPr>
+              <a:t>DefaultFormatting</a:t>
+            </a:r>
+            <a:endParaRPr lang="en-US" altLang="ko-KR" dirty="0">
+              <a:solidFill>
+                <a:schemeClr val="tx1"/>
+              </a:solidFill>
+            </a:endParaRPr>
+          </a:p>
+          <a:p>
+            <a:pPr algn="ctr"/>
+            <a:r>
+              <a:rPr lang="en-US" altLang="ko-KR" dirty="0" err="1">
+                <a:solidFill>
+                  <a:schemeClr val="tx1"/>
+                </a:solidFill>
+              </a:rPr>
+              <a:t>ConversionService</a:t>
+            </a:r>
+            <a:endParaRPr lang="en-US" altLang="ko-KR" dirty="0">
+              <a:solidFill>
+                <a:schemeClr val="tx1"/>
+              </a:solidFill>
+            </a:endParaRPr>
+          </a:p>
+        </p:txBody>
+      </p:sp>
+      <p:cxnSp>
+        <p:nvCxnSpPr>
+          <p:cNvPr id="11" name="직선 화살표 연결선 10">
+            <a:extLst>
+              <a:ext uri="{FF2B5EF4-FFF2-40B4-BE49-F238E27FC236}">
+                <a16:creationId xmlns:a16="http://schemas.microsoft.com/office/drawing/2014/main" id="{BC2A93D4-83B7-3A4F-9F4F-6C0EBB99B33B}"/>
+              </a:ext>
+            </a:extLst>
+          </p:cNvPr>
+          <p:cNvCxnSpPr>
+            <a:cxnSpLocks/>
+            <a:stCxn id="10" idx="0"/>
+            <a:endCxn id="7" idx="2"/>
+          </p:cNvCxnSpPr>
+          <p:nvPr/>
+        </p:nvCxnSpPr>
+        <p:spPr>
+          <a:xfrm flipH="1" flipV="1">
+            <a:off x="5059316" y="3861816"/>
+            <a:ext cx="1341122" cy="591312"/>
+          </a:xfrm>
+          <a:prstGeom prst="straightConnector1">
+            <a:avLst/>
+          </a:prstGeom>
+          <a:ln>
+            <a:tailEnd type="triangle"/>
+          </a:ln>
+        </p:spPr>
+        <p:style>
+          <a:lnRef idx="1">
+            <a:schemeClr val="accent1"/>
+          </a:lnRef>
+          <a:fillRef idx="0">
+            <a:schemeClr val="accent1"/>
+          </a:fillRef>
+          <a:effectRef idx="0">
+            <a:schemeClr val="accent1"/>
+          </a:effectRef>
+          <a:fontRef idx="minor">
+            <a:schemeClr val="tx1"/>
+          </a:fontRef>
+        </p:style>
+      </p:cxnSp>
+      <p:cxnSp>
+        <p:nvCxnSpPr>
+          <p:cNvPr id="14" name="직선 화살표 연결선 13">
+            <a:extLst>
+              <a:ext uri="{FF2B5EF4-FFF2-40B4-BE49-F238E27FC236}">
+                <a16:creationId xmlns:a16="http://schemas.microsoft.com/office/drawing/2014/main" id="{1FB9D8DC-5B16-7348-BFD0-D3531A6AADF3}"/>
+              </a:ext>
+            </a:extLst>
+          </p:cNvPr>
+          <p:cNvCxnSpPr>
+            <a:cxnSpLocks/>
+            <a:stCxn id="10" idx="0"/>
+            <a:endCxn id="8" idx="2"/>
+          </p:cNvCxnSpPr>
+          <p:nvPr/>
+        </p:nvCxnSpPr>
+        <p:spPr>
+          <a:xfrm flipV="1">
+            <a:off x="6400438" y="3861816"/>
+            <a:ext cx="1292352" cy="591312"/>
+          </a:xfrm>
+          <a:prstGeom prst="straightConnector1">
+            <a:avLst/>
+          </a:prstGeom>
+          <a:ln>
+            <a:tailEnd type="triangle"/>
+          </a:ln>
+        </p:spPr>
+        <p:style>
+          <a:lnRef idx="1">
+            <a:schemeClr val="accent1"/>
+          </a:lnRef>
+          <a:fillRef idx="0">
+            <a:schemeClr val="accent1"/>
+          </a:fillRef>
+          <a:effectRef idx="0">
+            <a:schemeClr val="accent1"/>
+          </a:effectRef>
+          <a:fontRef idx="minor">
+            <a:schemeClr val="tx1"/>
+          </a:fontRef>
+        </p:style>
+      </p:cxnSp>
+      <p:cxnSp>
+        <p:nvCxnSpPr>
+          <p:cNvPr id="17" name="직선 화살표 연결선 16">
+            <a:extLst>
+              <a:ext uri="{FF2B5EF4-FFF2-40B4-BE49-F238E27FC236}">
+                <a16:creationId xmlns:a16="http://schemas.microsoft.com/office/drawing/2014/main" id="{5C25A0E7-412B-9742-9EF1-376C6ACF7BCC}"/>
+              </a:ext>
+            </a:extLst>
+          </p:cNvPr>
+          <p:cNvCxnSpPr>
+            <a:cxnSpLocks/>
+            <a:stCxn id="8" idx="0"/>
+            <a:endCxn id="9" idx="2"/>
+          </p:cNvCxnSpPr>
+          <p:nvPr/>
+        </p:nvCxnSpPr>
+        <p:spPr>
+          <a:xfrm flipV="1">
+            <a:off x="7692790" y="2551176"/>
+            <a:ext cx="0" cy="396240"/>
+          </a:xfrm>
+          <a:prstGeom prst="straightConnector1">
+            <a:avLst/>
+          </a:prstGeom>
+          <a:ln>
+            <a:tailEnd type="triangle"/>
+          </a:ln>
+        </p:spPr>
+        <p:style>
+          <a:lnRef idx="1">
+            <a:schemeClr val="accent1"/>
+          </a:lnRef>
+          <a:fillRef idx="0">
+            <a:schemeClr val="accent1"/>
+          </a:fillRef>
+          <a:effectRef idx="0">
+            <a:schemeClr val="accent1"/>
+          </a:effectRef>
+          <a:fontRef idx="minor">
+            <a:schemeClr val="tx1"/>
+          </a:fontRef>
+        </p:style>
+      </p:cxnSp>
     </p:spTree>
     <p:extLst>
       <p:ext uri="{BB962C8B-B14F-4D97-AF65-F5344CB8AC3E}">
         <p14:creationId xmlns:p14="http://schemas.microsoft.com/office/powerpoint/2010/main" val="495873685"/>
+      </p:ext>
+    </p:extLst>
+  </p:cSld>
+  <p:clrMapOvr>
+    <a:masterClrMapping/>
+  </p:clrMapOvr>
+</p:sld>
+</file>
+
+<file path=ppt/slides/slide11.xml><?xml version="1.0" encoding="utf-8"?>
+<p:sld xmlns:a="http://schemas.openxmlformats.org/drawingml/2006/main" xmlns:r="http://schemas.openxmlformats.org/officeDocument/2006/relationships" xmlns:p="http://schemas.openxmlformats.org/presentationml/2006/main">
+  <p:cSld>
+    <p:spTree>
+      <p:nvGrpSpPr>
+        <p:cNvPr id="1" name=""/>
+        <p:cNvGrpSpPr/>
+        <p:nvPr/>
+      </p:nvGrpSpPr>
+      <p:grpSpPr>
+        <a:xfrm>
+          <a:off x="0" y="0"/>
+          <a:ext cx="0" cy="0"/>
+          <a:chOff x="0" y="0"/>
+          <a:chExt cx="0" cy="0"/>
+        </a:xfrm>
+      </p:grpSpPr>
+      <p:sp>
+        <p:nvSpPr>
+          <p:cNvPr id="38" name="TextBox 37">
+            <a:extLst>
+              <a:ext uri="{FF2B5EF4-FFF2-40B4-BE49-F238E27FC236}">
+                <a16:creationId xmlns:a16="http://schemas.microsoft.com/office/drawing/2014/main" id="{41C7FBC6-1ADE-614B-A639-CE04E73D33B6}"/>
+              </a:ext>
+            </a:extLst>
+          </p:cNvPr>
+          <p:cNvSpPr txBox="1"/>
+          <p:nvPr/>
+        </p:nvSpPr>
+        <p:spPr>
+          <a:xfrm>
+            <a:off x="163546" y="236746"/>
+            <a:ext cx="2457006" cy="276999"/>
+          </a:xfrm>
+          <a:prstGeom prst="rect">
+            <a:avLst/>
+          </a:prstGeom>
+          <a:noFill/>
+        </p:spPr>
+        <p:txBody>
+          <a:bodyPr wrap="square" rtlCol="0">
+            <a:spAutoFit/>
+          </a:bodyPr>
+          <a:lstStyle/>
+          <a:p>
+            <a:r>
+              <a:rPr lang="en-US" altLang="ko-KR" sz="1200" dirty="0"/>
+              <a:t>AOP native approach</a:t>
+            </a:r>
+          </a:p>
+        </p:txBody>
+      </p:sp>
+      <p:sp>
+        <p:nvSpPr>
+          <p:cNvPr id="18" name="모서리가 둥근 직사각형 17">
+            <a:extLst>
+              <a:ext uri="{FF2B5EF4-FFF2-40B4-BE49-F238E27FC236}">
+                <a16:creationId xmlns:a16="http://schemas.microsoft.com/office/drawing/2014/main" id="{08473F11-2D11-214B-BBD6-034265118EB2}"/>
+              </a:ext>
+            </a:extLst>
+          </p:cNvPr>
+          <p:cNvSpPr/>
+          <p:nvPr/>
+        </p:nvSpPr>
+        <p:spPr>
+          <a:xfrm>
+            <a:off x="4105790" y="1548586"/>
+            <a:ext cx="892978" cy="2717054"/>
+          </a:xfrm>
+          <a:prstGeom prst="roundRect">
+            <a:avLst/>
+          </a:prstGeom>
+        </p:spPr>
+        <p:style>
+          <a:lnRef idx="2">
+            <a:schemeClr val="accent1">
+              <a:shade val="50000"/>
+            </a:schemeClr>
+          </a:lnRef>
+          <a:fillRef idx="1">
+            <a:schemeClr val="accent1"/>
+          </a:fillRef>
+          <a:effectRef idx="0">
+            <a:schemeClr val="accent1"/>
+          </a:effectRef>
+          <a:fontRef idx="minor">
+            <a:schemeClr val="lt1"/>
+          </a:fontRef>
+        </p:style>
+        <p:txBody>
+          <a:bodyPr rtlCol="0" anchor="t" anchorCtr="0"/>
+          <a:lstStyle/>
+          <a:p>
+            <a:pPr algn="ctr"/>
+            <a:endParaRPr lang="en-US" altLang="ko-KR" sz="1600" dirty="0"/>
+          </a:p>
+          <a:p>
+            <a:pPr algn="ctr"/>
+            <a:r>
+              <a:rPr lang="en-US" altLang="ko-KR" sz="1400" dirty="0"/>
+              <a:t>Class A</a:t>
+            </a:r>
+            <a:endParaRPr lang="ko-KR" altLang="en-US" sz="1400" dirty="0"/>
+          </a:p>
+        </p:txBody>
+      </p:sp>
+      <p:sp>
+        <p:nvSpPr>
+          <p:cNvPr id="19" name="모서리가 둥근 직사각형 18">
+            <a:extLst>
+              <a:ext uri="{FF2B5EF4-FFF2-40B4-BE49-F238E27FC236}">
+                <a16:creationId xmlns:a16="http://schemas.microsoft.com/office/drawing/2014/main" id="{8EBBC251-F163-6949-8D33-5F20942A7D8B}"/>
+              </a:ext>
+            </a:extLst>
+          </p:cNvPr>
+          <p:cNvSpPr/>
+          <p:nvPr/>
+        </p:nvSpPr>
+        <p:spPr>
+          <a:xfrm>
+            <a:off x="5154568" y="1548586"/>
+            <a:ext cx="892978" cy="2717054"/>
+          </a:xfrm>
+          <a:prstGeom prst="roundRect">
+            <a:avLst/>
+          </a:prstGeom>
+        </p:spPr>
+        <p:style>
+          <a:lnRef idx="2">
+            <a:schemeClr val="accent6">
+              <a:shade val="50000"/>
+            </a:schemeClr>
+          </a:lnRef>
+          <a:fillRef idx="1">
+            <a:schemeClr val="accent6"/>
+          </a:fillRef>
+          <a:effectRef idx="0">
+            <a:schemeClr val="accent6"/>
+          </a:effectRef>
+          <a:fontRef idx="minor">
+            <a:schemeClr val="lt1"/>
+          </a:fontRef>
+        </p:style>
+        <p:txBody>
+          <a:bodyPr rtlCol="0" anchor="t" anchorCtr="1"/>
+          <a:lstStyle/>
+          <a:p>
+            <a:pPr algn="ctr"/>
+            <a:endParaRPr lang="en-US" altLang="ko-KR" sz="1600" dirty="0"/>
+          </a:p>
+          <a:p>
+            <a:pPr algn="ctr"/>
+            <a:r>
+              <a:rPr lang="en-US" altLang="ko-KR" sz="1400" dirty="0"/>
+              <a:t>Class B</a:t>
+            </a:r>
+            <a:endParaRPr lang="ko-KR" altLang="en-US" sz="1400" dirty="0"/>
+          </a:p>
+        </p:txBody>
+      </p:sp>
+      <p:sp>
+        <p:nvSpPr>
+          <p:cNvPr id="20" name="모서리가 둥근 직사각형 19">
+            <a:extLst>
+              <a:ext uri="{FF2B5EF4-FFF2-40B4-BE49-F238E27FC236}">
+                <a16:creationId xmlns:a16="http://schemas.microsoft.com/office/drawing/2014/main" id="{D7DBFD9C-24CD-0A40-BC8F-6D97EB0D149C}"/>
+              </a:ext>
+            </a:extLst>
+          </p:cNvPr>
+          <p:cNvSpPr/>
+          <p:nvPr/>
+        </p:nvSpPr>
+        <p:spPr>
+          <a:xfrm>
+            <a:off x="6222904" y="1558509"/>
+            <a:ext cx="892978" cy="2717054"/>
+          </a:xfrm>
+          <a:prstGeom prst="roundRect">
+            <a:avLst/>
+          </a:prstGeom>
+        </p:spPr>
+        <p:style>
+          <a:lnRef idx="2">
+            <a:schemeClr val="accent3">
+              <a:shade val="50000"/>
+            </a:schemeClr>
+          </a:lnRef>
+          <a:fillRef idx="1">
+            <a:schemeClr val="accent3"/>
+          </a:fillRef>
+          <a:effectRef idx="0">
+            <a:schemeClr val="accent3"/>
+          </a:effectRef>
+          <a:fontRef idx="minor">
+            <a:schemeClr val="lt1"/>
+          </a:fontRef>
+        </p:style>
+        <p:txBody>
+          <a:bodyPr rtlCol="0" anchor="t" anchorCtr="1"/>
+          <a:lstStyle/>
+          <a:p>
+            <a:pPr algn="ctr"/>
+            <a:endParaRPr lang="en-US" altLang="ko-KR" sz="1600" dirty="0"/>
+          </a:p>
+          <a:p>
+            <a:pPr algn="ctr"/>
+            <a:r>
+              <a:rPr lang="en-US" altLang="ko-KR" sz="1400" dirty="0"/>
+              <a:t>Class C</a:t>
+            </a:r>
+            <a:endParaRPr lang="ko-KR" altLang="en-US" sz="1400" dirty="0"/>
+          </a:p>
+        </p:txBody>
+      </p:sp>
+      <p:sp>
+        <p:nvSpPr>
+          <p:cNvPr id="21" name="모서리가 둥근 직사각형 20">
+            <a:extLst>
+              <a:ext uri="{FF2B5EF4-FFF2-40B4-BE49-F238E27FC236}">
+                <a16:creationId xmlns:a16="http://schemas.microsoft.com/office/drawing/2014/main" id="{59AAA13C-27E2-814B-B7A8-BA1A64EDADE0}"/>
+              </a:ext>
+            </a:extLst>
+          </p:cNvPr>
+          <p:cNvSpPr/>
+          <p:nvPr/>
+        </p:nvSpPr>
+        <p:spPr>
+          <a:xfrm>
+            <a:off x="4109522" y="3775239"/>
+            <a:ext cx="3006362" cy="456361"/>
+          </a:xfrm>
+          <a:prstGeom prst="roundRect">
+            <a:avLst/>
+          </a:prstGeom>
+        </p:spPr>
+        <p:style>
+          <a:lnRef idx="1">
+            <a:schemeClr val="accent5"/>
+          </a:lnRef>
+          <a:fillRef idx="2">
+            <a:schemeClr val="accent5"/>
+          </a:fillRef>
+          <a:effectRef idx="1">
+            <a:schemeClr val="accent5"/>
+          </a:effectRef>
+          <a:fontRef idx="minor">
+            <a:schemeClr val="dk1"/>
+          </a:fontRef>
+        </p:style>
+        <p:txBody>
+          <a:bodyPr rtlCol="0" anchor="ctr"/>
+          <a:lstStyle/>
+          <a:p>
+            <a:pPr algn="ctr"/>
+            <a:r>
+              <a:rPr lang="en-US" altLang="ko-KR" sz="1600" dirty="0"/>
+              <a:t>Transaction</a:t>
+            </a:r>
+            <a:endParaRPr lang="ko-KR" altLang="en-US" sz="1600" dirty="0"/>
+          </a:p>
+        </p:txBody>
+      </p:sp>
+      <p:sp>
+        <p:nvSpPr>
+          <p:cNvPr id="22" name="모서리가 둥근 직사각형 21">
+            <a:extLst>
+              <a:ext uri="{FF2B5EF4-FFF2-40B4-BE49-F238E27FC236}">
+                <a16:creationId xmlns:a16="http://schemas.microsoft.com/office/drawing/2014/main" id="{E6C464FE-CDA3-6F48-B7A8-F997E9007B17}"/>
+              </a:ext>
+            </a:extLst>
+          </p:cNvPr>
+          <p:cNvSpPr/>
+          <p:nvPr/>
+        </p:nvSpPr>
+        <p:spPr>
+          <a:xfrm>
+            <a:off x="4105790" y="2634262"/>
+            <a:ext cx="3010092" cy="456361"/>
+          </a:xfrm>
+          <a:prstGeom prst="roundRect">
+            <a:avLst/>
+          </a:prstGeom>
+        </p:spPr>
+        <p:style>
+          <a:lnRef idx="1">
+            <a:schemeClr val="dk1"/>
+          </a:lnRef>
+          <a:fillRef idx="2">
+            <a:schemeClr val="dk1"/>
+          </a:fillRef>
+          <a:effectRef idx="1">
+            <a:schemeClr val="dk1"/>
+          </a:effectRef>
+          <a:fontRef idx="minor">
+            <a:schemeClr val="dk1"/>
+          </a:fontRef>
+        </p:style>
+        <p:txBody>
+          <a:bodyPr rtlCol="0" anchor="ctr"/>
+          <a:lstStyle/>
+          <a:p>
+            <a:pPr algn="ctr"/>
+            <a:r>
+              <a:rPr lang="en-US" altLang="ko-KR" sz="1600" dirty="0"/>
+              <a:t>Logging</a:t>
+            </a:r>
+            <a:endParaRPr lang="ko-KR" altLang="en-US" sz="1600" dirty="0"/>
+          </a:p>
+        </p:txBody>
+      </p:sp>
+      <p:sp>
+        <p:nvSpPr>
+          <p:cNvPr id="23" name="모서리가 둥근 직사각형 22">
+            <a:extLst>
+              <a:ext uri="{FF2B5EF4-FFF2-40B4-BE49-F238E27FC236}">
+                <a16:creationId xmlns:a16="http://schemas.microsoft.com/office/drawing/2014/main" id="{32E012BA-48AA-CE45-A1D6-467CA2884F48}"/>
+              </a:ext>
+            </a:extLst>
+          </p:cNvPr>
+          <p:cNvSpPr/>
+          <p:nvPr/>
+        </p:nvSpPr>
+        <p:spPr>
+          <a:xfrm>
+            <a:off x="4105791" y="3210326"/>
+            <a:ext cx="3010092" cy="456361"/>
+          </a:xfrm>
+          <a:prstGeom prst="roundRect">
+            <a:avLst/>
+          </a:prstGeom>
+        </p:spPr>
+        <p:style>
+          <a:lnRef idx="1">
+            <a:schemeClr val="accent4"/>
+          </a:lnRef>
+          <a:fillRef idx="2">
+            <a:schemeClr val="accent4"/>
+          </a:fillRef>
+          <a:effectRef idx="1">
+            <a:schemeClr val="accent4"/>
+          </a:effectRef>
+          <a:fontRef idx="minor">
+            <a:schemeClr val="dk1"/>
+          </a:fontRef>
+        </p:style>
+        <p:txBody>
+          <a:bodyPr rtlCol="0" anchor="ctr"/>
+          <a:lstStyle/>
+          <a:p>
+            <a:pPr algn="ctr"/>
+            <a:r>
+              <a:rPr lang="en-US" altLang="ko-KR" sz="1600" dirty="0"/>
+              <a:t>Security</a:t>
+            </a:r>
+            <a:endParaRPr lang="ko-KR" altLang="en-US" sz="1600" dirty="0"/>
+          </a:p>
+        </p:txBody>
+      </p:sp>
+    </p:spTree>
+    <p:extLst>
+      <p:ext uri="{BB962C8B-B14F-4D97-AF65-F5344CB8AC3E}">
+        <p14:creationId xmlns:p14="http://schemas.microsoft.com/office/powerpoint/2010/main" val="4248822940"/>
+      </p:ext>
+    </p:extLst>
+  </p:cSld>
+  <p:clrMapOvr>
+    <a:masterClrMapping/>
+  </p:clrMapOvr>
+</p:sld>
+</file>
+
+<file path=ppt/slides/slide12.xml><?xml version="1.0" encoding="utf-8"?>
+<p:sld xmlns:a="http://schemas.openxmlformats.org/drawingml/2006/main" xmlns:r="http://schemas.openxmlformats.org/officeDocument/2006/relationships" xmlns:p="http://schemas.openxmlformats.org/presentationml/2006/main">
+  <p:cSld>
+    <p:spTree>
+      <p:nvGrpSpPr>
+        <p:cNvPr id="1" name=""/>
+        <p:cNvGrpSpPr/>
+        <p:nvPr/>
+      </p:nvGrpSpPr>
+      <p:grpSpPr>
+        <a:xfrm>
+          <a:off x="0" y="0"/>
+          <a:ext cx="0" cy="0"/>
+          <a:chOff x="0" y="0"/>
+          <a:chExt cx="0" cy="0"/>
+        </a:xfrm>
+      </p:grpSpPr>
+      <p:sp>
+        <p:nvSpPr>
+          <p:cNvPr id="38" name="TextBox 37">
+            <a:extLst>
+              <a:ext uri="{FF2B5EF4-FFF2-40B4-BE49-F238E27FC236}">
+                <a16:creationId xmlns:a16="http://schemas.microsoft.com/office/drawing/2014/main" id="{41C7FBC6-1ADE-614B-A639-CE04E73D33B6}"/>
+              </a:ext>
+            </a:extLst>
+          </p:cNvPr>
+          <p:cNvSpPr txBox="1"/>
+          <p:nvPr/>
+        </p:nvSpPr>
+        <p:spPr>
+          <a:xfrm>
+            <a:off x="163546" y="236746"/>
+            <a:ext cx="2457006" cy="276999"/>
+          </a:xfrm>
+          <a:prstGeom prst="rect">
+            <a:avLst/>
+          </a:prstGeom>
+          <a:noFill/>
+        </p:spPr>
+        <p:txBody>
+          <a:bodyPr wrap="square" rtlCol="0">
+            <a:spAutoFit/>
+          </a:bodyPr>
+          <a:lstStyle/>
+          <a:p>
+            <a:r>
+              <a:rPr lang="en-US" altLang="ko-KR" sz="1200" dirty="0"/>
+              <a:t>AOP </a:t>
+            </a:r>
+            <a:r>
+              <a:rPr lang="en-US" altLang="ko-KR" sz="1200"/>
+              <a:t>crosscutting concerns</a:t>
+            </a:r>
+            <a:endParaRPr lang="en-US" altLang="ko-KR" sz="1200" dirty="0"/>
+          </a:p>
+        </p:txBody>
+      </p:sp>
+      <p:sp>
+        <p:nvSpPr>
+          <p:cNvPr id="18" name="모서리가 둥근 직사각형 17">
+            <a:extLst>
+              <a:ext uri="{FF2B5EF4-FFF2-40B4-BE49-F238E27FC236}">
+                <a16:creationId xmlns:a16="http://schemas.microsoft.com/office/drawing/2014/main" id="{08473F11-2D11-214B-BBD6-034265118EB2}"/>
+              </a:ext>
+            </a:extLst>
+          </p:cNvPr>
+          <p:cNvSpPr/>
+          <p:nvPr/>
+        </p:nvSpPr>
+        <p:spPr>
+          <a:xfrm>
+            <a:off x="4105790" y="1548586"/>
+            <a:ext cx="892978" cy="2717054"/>
+          </a:xfrm>
+          <a:prstGeom prst="roundRect">
+            <a:avLst/>
+          </a:prstGeom>
+        </p:spPr>
+        <p:style>
+          <a:lnRef idx="2">
+            <a:schemeClr val="accent1">
+              <a:shade val="50000"/>
+            </a:schemeClr>
+          </a:lnRef>
+          <a:fillRef idx="1">
+            <a:schemeClr val="accent1"/>
+          </a:fillRef>
+          <a:effectRef idx="0">
+            <a:schemeClr val="accent1"/>
+          </a:effectRef>
+          <a:fontRef idx="minor">
+            <a:schemeClr val="lt1"/>
+          </a:fontRef>
+        </p:style>
+        <p:txBody>
+          <a:bodyPr rtlCol="0" anchor="t" anchorCtr="0"/>
+          <a:lstStyle/>
+          <a:p>
+            <a:pPr algn="ctr"/>
+            <a:endParaRPr lang="en-US" altLang="ko-KR" sz="1600" dirty="0"/>
+          </a:p>
+          <a:p>
+            <a:pPr algn="ctr"/>
+            <a:r>
+              <a:rPr lang="en-US" altLang="ko-KR" sz="1400" dirty="0"/>
+              <a:t>Class A</a:t>
+            </a:r>
+            <a:endParaRPr lang="ko-KR" altLang="en-US" sz="1400" dirty="0"/>
+          </a:p>
+        </p:txBody>
+      </p:sp>
+      <p:sp>
+        <p:nvSpPr>
+          <p:cNvPr id="19" name="모서리가 둥근 직사각형 18">
+            <a:extLst>
+              <a:ext uri="{FF2B5EF4-FFF2-40B4-BE49-F238E27FC236}">
+                <a16:creationId xmlns:a16="http://schemas.microsoft.com/office/drawing/2014/main" id="{8EBBC251-F163-6949-8D33-5F20942A7D8B}"/>
+              </a:ext>
+            </a:extLst>
+          </p:cNvPr>
+          <p:cNvSpPr/>
+          <p:nvPr/>
+        </p:nvSpPr>
+        <p:spPr>
+          <a:xfrm>
+            <a:off x="5154568" y="1548586"/>
+            <a:ext cx="892978" cy="2717054"/>
+          </a:xfrm>
+          <a:prstGeom prst="roundRect">
+            <a:avLst/>
+          </a:prstGeom>
+        </p:spPr>
+        <p:style>
+          <a:lnRef idx="2">
+            <a:schemeClr val="accent6">
+              <a:shade val="50000"/>
+            </a:schemeClr>
+          </a:lnRef>
+          <a:fillRef idx="1">
+            <a:schemeClr val="accent6"/>
+          </a:fillRef>
+          <a:effectRef idx="0">
+            <a:schemeClr val="accent6"/>
+          </a:effectRef>
+          <a:fontRef idx="minor">
+            <a:schemeClr val="lt1"/>
+          </a:fontRef>
+        </p:style>
+        <p:txBody>
+          <a:bodyPr rtlCol="0" anchor="t" anchorCtr="1"/>
+          <a:lstStyle/>
+          <a:p>
+            <a:pPr algn="ctr"/>
+            <a:endParaRPr lang="en-US" altLang="ko-KR" sz="1600" dirty="0"/>
+          </a:p>
+          <a:p>
+            <a:pPr algn="ctr"/>
+            <a:r>
+              <a:rPr lang="en-US" altLang="ko-KR" sz="1400" dirty="0"/>
+              <a:t>Class B</a:t>
+            </a:r>
+            <a:endParaRPr lang="ko-KR" altLang="en-US" sz="1400" dirty="0"/>
+          </a:p>
+        </p:txBody>
+      </p:sp>
+      <p:sp>
+        <p:nvSpPr>
+          <p:cNvPr id="20" name="모서리가 둥근 직사각형 19">
+            <a:extLst>
+              <a:ext uri="{FF2B5EF4-FFF2-40B4-BE49-F238E27FC236}">
+                <a16:creationId xmlns:a16="http://schemas.microsoft.com/office/drawing/2014/main" id="{D7DBFD9C-24CD-0A40-BC8F-6D97EB0D149C}"/>
+              </a:ext>
+            </a:extLst>
+          </p:cNvPr>
+          <p:cNvSpPr/>
+          <p:nvPr/>
+        </p:nvSpPr>
+        <p:spPr>
+          <a:xfrm>
+            <a:off x="6222904" y="1558509"/>
+            <a:ext cx="892978" cy="2717054"/>
+          </a:xfrm>
+          <a:prstGeom prst="roundRect">
+            <a:avLst/>
+          </a:prstGeom>
+        </p:spPr>
+        <p:style>
+          <a:lnRef idx="2">
+            <a:schemeClr val="accent3">
+              <a:shade val="50000"/>
+            </a:schemeClr>
+          </a:lnRef>
+          <a:fillRef idx="1">
+            <a:schemeClr val="accent3"/>
+          </a:fillRef>
+          <a:effectRef idx="0">
+            <a:schemeClr val="accent3"/>
+          </a:effectRef>
+          <a:fontRef idx="minor">
+            <a:schemeClr val="lt1"/>
+          </a:fontRef>
+        </p:style>
+        <p:txBody>
+          <a:bodyPr rtlCol="0" anchor="t" anchorCtr="1"/>
+          <a:lstStyle/>
+          <a:p>
+            <a:pPr algn="ctr"/>
+            <a:endParaRPr lang="en-US" altLang="ko-KR" sz="1600" dirty="0"/>
+          </a:p>
+          <a:p>
+            <a:pPr algn="ctr"/>
+            <a:r>
+              <a:rPr lang="en-US" altLang="ko-KR" sz="1400" dirty="0"/>
+              <a:t>Class C</a:t>
+            </a:r>
+            <a:endParaRPr lang="ko-KR" altLang="en-US" sz="1400" dirty="0"/>
+          </a:p>
+        </p:txBody>
+      </p:sp>
+      <p:sp>
+        <p:nvSpPr>
+          <p:cNvPr id="21" name="모서리가 둥근 직사각형 20">
+            <a:extLst>
+              <a:ext uri="{FF2B5EF4-FFF2-40B4-BE49-F238E27FC236}">
+                <a16:creationId xmlns:a16="http://schemas.microsoft.com/office/drawing/2014/main" id="{59AAA13C-27E2-814B-B7A8-BA1A64EDADE0}"/>
+              </a:ext>
+            </a:extLst>
+          </p:cNvPr>
+          <p:cNvSpPr/>
+          <p:nvPr/>
+        </p:nvSpPr>
+        <p:spPr>
+          <a:xfrm>
+            <a:off x="4109522" y="3775239"/>
+            <a:ext cx="3006362" cy="456361"/>
+          </a:xfrm>
+          <a:prstGeom prst="roundRect">
+            <a:avLst/>
+          </a:prstGeom>
+        </p:spPr>
+        <p:style>
+          <a:lnRef idx="1">
+            <a:schemeClr val="accent5"/>
+          </a:lnRef>
+          <a:fillRef idx="2">
+            <a:schemeClr val="accent5"/>
+          </a:fillRef>
+          <a:effectRef idx="1">
+            <a:schemeClr val="accent5"/>
+          </a:effectRef>
+          <a:fontRef idx="minor">
+            <a:schemeClr val="dk1"/>
+          </a:fontRef>
+        </p:style>
+        <p:txBody>
+          <a:bodyPr rtlCol="0" anchor="ctr"/>
+          <a:lstStyle/>
+          <a:p>
+            <a:pPr algn="ctr"/>
+            <a:r>
+              <a:rPr lang="en-US" altLang="ko-KR" sz="1600" dirty="0"/>
+              <a:t>Transaction</a:t>
+            </a:r>
+            <a:endParaRPr lang="ko-KR" altLang="en-US" sz="1600" dirty="0"/>
+          </a:p>
+        </p:txBody>
+      </p:sp>
+      <p:sp>
+        <p:nvSpPr>
+          <p:cNvPr id="22" name="모서리가 둥근 직사각형 21">
+            <a:extLst>
+              <a:ext uri="{FF2B5EF4-FFF2-40B4-BE49-F238E27FC236}">
+                <a16:creationId xmlns:a16="http://schemas.microsoft.com/office/drawing/2014/main" id="{E6C464FE-CDA3-6F48-B7A8-F997E9007B17}"/>
+              </a:ext>
+            </a:extLst>
+          </p:cNvPr>
+          <p:cNvSpPr/>
+          <p:nvPr/>
+        </p:nvSpPr>
+        <p:spPr>
+          <a:xfrm>
+            <a:off x="4105790" y="2634262"/>
+            <a:ext cx="3010092" cy="456361"/>
+          </a:xfrm>
+          <a:prstGeom prst="roundRect">
+            <a:avLst/>
+          </a:prstGeom>
+        </p:spPr>
+        <p:style>
+          <a:lnRef idx="1">
+            <a:schemeClr val="dk1"/>
+          </a:lnRef>
+          <a:fillRef idx="2">
+            <a:schemeClr val="dk1"/>
+          </a:fillRef>
+          <a:effectRef idx="1">
+            <a:schemeClr val="dk1"/>
+          </a:effectRef>
+          <a:fontRef idx="minor">
+            <a:schemeClr val="dk1"/>
+          </a:fontRef>
+        </p:style>
+        <p:txBody>
+          <a:bodyPr rtlCol="0" anchor="ctr"/>
+          <a:lstStyle/>
+          <a:p>
+            <a:pPr algn="ctr"/>
+            <a:r>
+              <a:rPr lang="en-US" altLang="ko-KR" sz="1600" dirty="0"/>
+              <a:t>Logging</a:t>
+            </a:r>
+            <a:endParaRPr lang="ko-KR" altLang="en-US" sz="1600" dirty="0"/>
+          </a:p>
+        </p:txBody>
+      </p:sp>
+      <p:sp>
+        <p:nvSpPr>
+          <p:cNvPr id="23" name="모서리가 둥근 직사각형 22">
+            <a:extLst>
+              <a:ext uri="{FF2B5EF4-FFF2-40B4-BE49-F238E27FC236}">
+                <a16:creationId xmlns:a16="http://schemas.microsoft.com/office/drawing/2014/main" id="{32E012BA-48AA-CE45-A1D6-467CA2884F48}"/>
+              </a:ext>
+            </a:extLst>
+          </p:cNvPr>
+          <p:cNvSpPr/>
+          <p:nvPr/>
+        </p:nvSpPr>
+        <p:spPr>
+          <a:xfrm>
+            <a:off x="4105791" y="3210326"/>
+            <a:ext cx="3010092" cy="456361"/>
+          </a:xfrm>
+          <a:prstGeom prst="roundRect">
+            <a:avLst/>
+          </a:prstGeom>
+        </p:spPr>
+        <p:style>
+          <a:lnRef idx="1">
+            <a:schemeClr val="accent4"/>
+          </a:lnRef>
+          <a:fillRef idx="2">
+            <a:schemeClr val="accent4"/>
+          </a:fillRef>
+          <a:effectRef idx="1">
+            <a:schemeClr val="accent4"/>
+          </a:effectRef>
+          <a:fontRef idx="minor">
+            <a:schemeClr val="dk1"/>
+          </a:fontRef>
+        </p:style>
+        <p:txBody>
+          <a:bodyPr rtlCol="0" anchor="ctr"/>
+          <a:lstStyle/>
+          <a:p>
+            <a:pPr algn="ctr"/>
+            <a:r>
+              <a:rPr lang="en-US" altLang="ko-KR" sz="1600" dirty="0"/>
+              <a:t>Security</a:t>
+            </a:r>
+            <a:endParaRPr lang="ko-KR" altLang="en-US" sz="1600" dirty="0"/>
+          </a:p>
+        </p:txBody>
+      </p:sp>
+    </p:spTree>
+    <p:extLst>
+      <p:ext uri="{BB962C8B-B14F-4D97-AF65-F5344CB8AC3E}">
+        <p14:creationId xmlns:p14="http://schemas.microsoft.com/office/powerpoint/2010/main" val="3968970782"/>
       </p:ext>
     </p:extLst>
   </p:cSld>
@@ -12646,7 +13810,7 @@
           <a:lstStyle/>
           <a:p>
             <a:r>
-              <a:rPr kumimoji="1" lang="en-US" altLang="ko-KR" sz="1200"/>
+              <a:rPr kumimoji="1" lang="en-US" altLang="ko-KR" sz="1200" dirty="0"/>
               <a:t>Proxy</a:t>
             </a:r>
             <a:endParaRPr kumimoji="1" lang="ko-KR" altLang="en-US" sz="1200" dirty="0"/>

</xml_diff>